<commit_message>
Added fixes to README
</commit_message>
<xml_diff>
--- a/images/IBP v2 Diagrams.pptx
+++ b/images/IBP v2 Diagrams.pptx
@@ -199,7 +199,7 @@
           <a:p>
             <a:fld id="{5B4B0F53-CC8B-7148-8695-EB334B12B8F1}" type="datetimeFigureOut">
               <a:rPr lang="en-US" smtClean="0"/>
-              <a:t>3/14/19</a:t>
+              <a:t>3/15/19</a:t>
             </a:fld>
             <a:endParaRPr lang="en-US"/>
           </a:p>
@@ -724,7 +724,7 @@
           <a:p>
             <a:fld id="{44E33E8C-9091-E149-95AD-7CF7074C4C12}" type="datetimeFigureOut">
               <a:rPr lang="en-US" smtClean="0"/>
-              <a:t>3/14/19</a:t>
+              <a:t>3/15/19</a:t>
             </a:fld>
             <a:endParaRPr lang="en-US"/>
           </a:p>
@@ -922,7 +922,7 @@
           <a:p>
             <a:fld id="{44E33E8C-9091-E149-95AD-7CF7074C4C12}" type="datetimeFigureOut">
               <a:rPr lang="en-US" smtClean="0"/>
-              <a:t>3/14/19</a:t>
+              <a:t>3/15/19</a:t>
             </a:fld>
             <a:endParaRPr lang="en-US"/>
           </a:p>
@@ -1130,7 +1130,7 @@
           <a:p>
             <a:fld id="{44E33E8C-9091-E149-95AD-7CF7074C4C12}" type="datetimeFigureOut">
               <a:rPr lang="en-US" smtClean="0"/>
-              <a:t>3/14/19</a:t>
+              <a:t>3/15/19</a:t>
             </a:fld>
             <a:endParaRPr lang="en-US"/>
           </a:p>
@@ -1328,7 +1328,7 @@
           <a:p>
             <a:fld id="{44E33E8C-9091-E149-95AD-7CF7074C4C12}" type="datetimeFigureOut">
               <a:rPr lang="en-US" smtClean="0"/>
-              <a:t>3/14/19</a:t>
+              <a:t>3/15/19</a:t>
             </a:fld>
             <a:endParaRPr lang="en-US"/>
           </a:p>
@@ -1603,7 +1603,7 @@
           <a:p>
             <a:fld id="{44E33E8C-9091-E149-95AD-7CF7074C4C12}" type="datetimeFigureOut">
               <a:rPr lang="en-US" smtClean="0"/>
-              <a:t>3/14/19</a:t>
+              <a:t>3/15/19</a:t>
             </a:fld>
             <a:endParaRPr lang="en-US"/>
           </a:p>
@@ -1868,7 +1868,7 @@
           <a:p>
             <a:fld id="{44E33E8C-9091-E149-95AD-7CF7074C4C12}" type="datetimeFigureOut">
               <a:rPr lang="en-US" smtClean="0"/>
-              <a:t>3/14/19</a:t>
+              <a:t>3/15/19</a:t>
             </a:fld>
             <a:endParaRPr lang="en-US"/>
           </a:p>
@@ -2280,7 +2280,7 @@
           <a:p>
             <a:fld id="{44E33E8C-9091-E149-95AD-7CF7074C4C12}" type="datetimeFigureOut">
               <a:rPr lang="en-US" smtClean="0"/>
-              <a:t>3/14/19</a:t>
+              <a:t>3/15/19</a:t>
             </a:fld>
             <a:endParaRPr lang="en-US"/>
           </a:p>
@@ -2421,7 +2421,7 @@
           <a:p>
             <a:fld id="{44E33E8C-9091-E149-95AD-7CF7074C4C12}" type="datetimeFigureOut">
               <a:rPr lang="en-US" smtClean="0"/>
-              <a:t>3/14/19</a:t>
+              <a:t>3/15/19</a:t>
             </a:fld>
             <a:endParaRPr lang="en-US"/>
           </a:p>
@@ -2534,7 +2534,7 @@
           <a:p>
             <a:fld id="{44E33E8C-9091-E149-95AD-7CF7074C4C12}" type="datetimeFigureOut">
               <a:rPr lang="en-US" smtClean="0"/>
-              <a:t>3/14/19</a:t>
+              <a:t>3/15/19</a:t>
             </a:fld>
             <a:endParaRPr lang="en-US"/>
           </a:p>
@@ -2845,7 +2845,7 @@
           <a:p>
             <a:fld id="{44E33E8C-9091-E149-95AD-7CF7074C4C12}" type="datetimeFigureOut">
               <a:rPr lang="en-US" smtClean="0"/>
-              <a:t>3/14/19</a:t>
+              <a:t>3/15/19</a:t>
             </a:fld>
             <a:endParaRPr lang="en-US"/>
           </a:p>
@@ -3133,7 +3133,7 @@
           <a:p>
             <a:fld id="{44E33E8C-9091-E149-95AD-7CF7074C4C12}" type="datetimeFigureOut">
               <a:rPr lang="en-US" smtClean="0"/>
-              <a:t>3/14/19</a:t>
+              <a:t>3/15/19</a:t>
             </a:fld>
             <a:endParaRPr lang="en-US"/>
           </a:p>
@@ -3374,7 +3374,7 @@
           <a:p>
             <a:fld id="{44E33E8C-9091-E149-95AD-7CF7074C4C12}" type="datetimeFigureOut">
               <a:rPr lang="en-US" smtClean="0"/>
-              <a:t>3/14/19</a:t>
+              <a:t>3/15/19</a:t>
             </a:fld>
             <a:endParaRPr lang="en-US"/>
           </a:p>
@@ -5121,13 +5121,18 @@
         </p:nvSpPr>
         <p:spPr>
           <a:xfrm>
-            <a:off x="1215390" y="1097280"/>
+            <a:off x="1219201" y="2198370"/>
             <a:ext cx="4023360" cy="662940"/>
           </a:xfrm>
           <a:prstGeom prst="rect">
             <a:avLst/>
           </a:prstGeom>
-          <a:noFill/>
+          <a:solidFill>
+            <a:schemeClr val="accent2">
+              <a:lumMod val="40000"/>
+              <a:lumOff val="60000"/>
+            </a:schemeClr>
+          </a:solidFill>
           <a:ln w="25400">
             <a:solidFill>
               <a:schemeClr val="tx1"/>
@@ -5161,7 +5166,7 @@
                   <a:schemeClr val="tx1"/>
                 </a:solidFill>
               </a:rPr>
-              <a:t>Clone Application Repo</a:t>
+              <a:t>1. Clone Application Repo</a:t>
             </a:r>
           </a:p>
         </p:txBody>
@@ -5180,13 +5185,18 @@
         </p:nvSpPr>
         <p:spPr>
           <a:xfrm>
-            <a:off x="1215390" y="2198370"/>
+            <a:off x="1219201" y="3299460"/>
             <a:ext cx="4023360" cy="662940"/>
           </a:xfrm>
           <a:prstGeom prst="rect">
             <a:avLst/>
           </a:prstGeom>
-          <a:noFill/>
+          <a:solidFill>
+            <a:schemeClr val="accent2">
+              <a:lumMod val="40000"/>
+              <a:lumOff val="60000"/>
+            </a:schemeClr>
+          </a:solidFill>
           <a:ln w="25400">
             <a:solidFill>
               <a:schemeClr val="tx1"/>
@@ -5220,7 +5230,7 @@
                   <a:schemeClr val="tx1"/>
                 </a:solidFill>
               </a:rPr>
-              <a:t>Package Smart Contract</a:t>
+              <a:t>2. Package Smart Contract</a:t>
             </a:r>
           </a:p>
         </p:txBody>
@@ -5242,7 +5252,7 @@
         </p:nvCxnSpPr>
         <p:spPr>
           <a:xfrm>
-            <a:off x="3227070" y="1760220"/>
+            <a:off x="3230881" y="2861310"/>
             <a:ext cx="0" cy="438150"/>
           </a:xfrm>
           <a:prstGeom prst="straightConnector1">
@@ -5284,7 +5294,7 @@
         </p:nvCxnSpPr>
         <p:spPr>
           <a:xfrm>
-            <a:off x="3227070" y="2861310"/>
+            <a:off x="3230881" y="3962400"/>
             <a:ext cx="0" cy="438150"/>
           </a:xfrm>
           <a:prstGeom prst="straightConnector1">
@@ -5326,13 +5336,18 @@
         </p:nvSpPr>
         <p:spPr>
           <a:xfrm>
-            <a:off x="1215390" y="3329940"/>
+            <a:off x="1219201" y="4431030"/>
             <a:ext cx="4023360" cy="662940"/>
           </a:xfrm>
           <a:prstGeom prst="rect">
             <a:avLst/>
           </a:prstGeom>
-          <a:noFill/>
+          <a:solidFill>
+            <a:schemeClr val="accent2">
+              <a:lumMod val="40000"/>
+              <a:lumOff val="60000"/>
+            </a:schemeClr>
+          </a:solidFill>
           <a:ln w="25400">
             <a:solidFill>
               <a:schemeClr val="tx1"/>
@@ -5366,7 +5381,7 @@
                   <a:schemeClr val="tx1"/>
                 </a:solidFill>
               </a:rPr>
-              <a:t>Create Cloud Services</a:t>
+              <a:t>3. Create Cloud Services</a:t>
             </a:r>
           </a:p>
         </p:txBody>
@@ -5385,13 +5400,18 @@
         </p:nvSpPr>
         <p:spPr>
           <a:xfrm>
-            <a:off x="1215390" y="4431030"/>
+            <a:off x="7250430" y="1097280"/>
             <a:ext cx="4023360" cy="662940"/>
           </a:xfrm>
           <a:prstGeom prst="rect">
             <a:avLst/>
           </a:prstGeom>
-          <a:noFill/>
+          <a:solidFill>
+            <a:schemeClr val="accent2">
+              <a:lumMod val="40000"/>
+              <a:lumOff val="60000"/>
+            </a:schemeClr>
+          </a:solidFill>
           <a:ln w="25400">
             <a:solidFill>
               <a:schemeClr val="tx1"/>
@@ -5425,77 +5445,37 @@
                   <a:schemeClr val="tx1"/>
                 </a:solidFill>
               </a:rPr>
-              <a:t>Build the Network</a:t>
-            </a:r>
-          </a:p>
-        </p:txBody>
-      </p:sp>
-      <p:cxnSp>
-        <p:nvCxnSpPr>
-          <p:cNvPr id="10" name="Straight Arrow Connector 9">
-            <a:extLst>
-              <a:ext uri="{FF2B5EF4-FFF2-40B4-BE49-F238E27FC236}">
-                <a16:creationId xmlns:a16="http://schemas.microsoft.com/office/drawing/2014/main" id="{E1E51118-92AD-CA44-8C1A-637587CB8EBA}"/>
-              </a:ext>
-            </a:extLst>
-          </p:cNvPr>
-          <p:cNvCxnSpPr>
-            <a:stCxn id="8" idx="2"/>
-            <a:endCxn id="9" idx="0"/>
-          </p:cNvCxnSpPr>
+              <a:t>4. Build the Network</a:t>
+            </a:r>
+          </a:p>
+        </p:txBody>
+      </p:sp>
+      <p:sp>
+        <p:nvSpPr>
+          <p:cNvPr id="12" name="Rectangle 11">
+            <a:extLst>
+              <a:ext uri="{FF2B5EF4-FFF2-40B4-BE49-F238E27FC236}">
+                <a16:creationId xmlns:a16="http://schemas.microsoft.com/office/drawing/2014/main" id="{EA94B59F-14A7-EA4A-9DD0-0949604508CE}"/>
+              </a:ext>
+            </a:extLst>
+          </p:cNvPr>
+          <p:cNvSpPr/>
           <p:nvPr/>
-        </p:nvCxnSpPr>
+        </p:nvSpPr>
         <p:spPr>
           <a:xfrm>
-            <a:off x="3227070" y="3992880"/>
-            <a:ext cx="0" cy="438150"/>
-          </a:xfrm>
-          <a:prstGeom prst="straightConnector1">
-            <a:avLst/>
-          </a:prstGeom>
-          <a:ln w="25400">
-            <a:solidFill>
-              <a:schemeClr val="tx1"/>
-            </a:solidFill>
-            <a:tailEnd type="triangle" w="lg" len="lg"/>
-          </a:ln>
-        </p:spPr>
-        <p:style>
-          <a:lnRef idx="1">
-            <a:schemeClr val="accent1"/>
-          </a:lnRef>
-          <a:fillRef idx="0">
-            <a:schemeClr val="accent1"/>
-          </a:fillRef>
-          <a:effectRef idx="0">
-            <a:schemeClr val="accent1"/>
-          </a:effectRef>
-          <a:fontRef idx="minor">
-            <a:schemeClr val="tx1"/>
-          </a:fontRef>
-        </p:style>
-      </p:cxnSp>
-      <p:sp>
-        <p:nvSpPr>
-          <p:cNvPr id="12" name="Rectangle 11">
-            <a:extLst>
-              <a:ext uri="{FF2B5EF4-FFF2-40B4-BE49-F238E27FC236}">
-                <a16:creationId xmlns:a16="http://schemas.microsoft.com/office/drawing/2014/main" id="{EA94B59F-14A7-EA4A-9DD0-0949604508CE}"/>
-              </a:ext>
-            </a:extLst>
-          </p:cNvPr>
-          <p:cNvSpPr/>
-          <p:nvPr/>
-        </p:nvSpPr>
-        <p:spPr>
-          <a:xfrm>
-            <a:off x="7250430" y="1097280"/>
+            <a:off x="7250430" y="2198370"/>
             <a:ext cx="4023360" cy="662940"/>
           </a:xfrm>
           <a:prstGeom prst="rect">
             <a:avLst/>
           </a:prstGeom>
-          <a:noFill/>
+          <a:solidFill>
+            <a:schemeClr val="accent2">
+              <a:lumMod val="40000"/>
+              <a:lumOff val="60000"/>
+            </a:schemeClr>
+          </a:solidFill>
           <a:ln w="25400">
             <a:solidFill>
               <a:schemeClr val="tx1"/>
@@ -5529,7 +5509,7 @@
                   <a:schemeClr val="tx1"/>
                 </a:solidFill>
               </a:rPr>
-              <a:t>Deploy Smart Contract to the Network</a:t>
+              <a:t>5. Deploy Smart Contract to the Network</a:t>
             </a:r>
           </a:p>
         </p:txBody>
@@ -5548,13 +5528,18 @@
         </p:nvSpPr>
         <p:spPr>
           <a:xfrm>
-            <a:off x="7250430" y="2198370"/>
+            <a:off x="7250430" y="3299460"/>
             <a:ext cx="4023360" cy="662940"/>
           </a:xfrm>
           <a:prstGeom prst="rect">
             <a:avLst/>
           </a:prstGeom>
-          <a:noFill/>
+          <a:solidFill>
+            <a:schemeClr val="accent2">
+              <a:lumMod val="40000"/>
+              <a:lumOff val="60000"/>
+            </a:schemeClr>
+          </a:solidFill>
           <a:ln w="25400">
             <a:solidFill>
               <a:schemeClr val="tx1"/>
@@ -5588,7 +5573,7 @@
                   <a:schemeClr val="tx1"/>
                 </a:solidFill>
               </a:rPr>
-              <a:t>Connect Application to the Network</a:t>
+              <a:t>6. Connect Application to the Network</a:t>
             </a:r>
           </a:p>
         </p:txBody>
@@ -5606,48 +5591,6 @@
             <a:stCxn id="12" idx="2"/>
             <a:endCxn id="13" idx="0"/>
           </p:cNvCxnSpPr>
-          <p:nvPr/>
-        </p:nvCxnSpPr>
-        <p:spPr>
-          <a:xfrm>
-            <a:off x="9262110" y="1760220"/>
-            <a:ext cx="0" cy="438150"/>
-          </a:xfrm>
-          <a:prstGeom prst="straightConnector1">
-            <a:avLst/>
-          </a:prstGeom>
-          <a:ln w="25400">
-            <a:solidFill>
-              <a:schemeClr val="tx1"/>
-            </a:solidFill>
-            <a:tailEnd type="triangle" w="lg" len="lg"/>
-          </a:ln>
-        </p:spPr>
-        <p:style>
-          <a:lnRef idx="1">
-            <a:schemeClr val="accent1"/>
-          </a:lnRef>
-          <a:fillRef idx="0">
-            <a:schemeClr val="accent1"/>
-          </a:fillRef>
-          <a:effectRef idx="0">
-            <a:schemeClr val="accent1"/>
-          </a:effectRef>
-          <a:fontRef idx="minor">
-            <a:schemeClr val="tx1"/>
-          </a:fontRef>
-        </p:style>
-      </p:cxnSp>
-      <p:cxnSp>
-        <p:nvCxnSpPr>
-          <p:cNvPr id="15" name="Straight Arrow Connector 14">
-            <a:extLst>
-              <a:ext uri="{FF2B5EF4-FFF2-40B4-BE49-F238E27FC236}">
-                <a16:creationId xmlns:a16="http://schemas.microsoft.com/office/drawing/2014/main" id="{69E66BCD-BDE9-9745-88A6-EAC3F067E080}"/>
-              </a:ext>
-            </a:extLst>
-          </p:cNvPr>
-          <p:cNvCxnSpPr/>
           <p:nvPr/>
         </p:nvCxnSpPr>
         <p:spPr>
@@ -5680,6 +5623,48 @@
           </a:fontRef>
         </p:style>
       </p:cxnSp>
+      <p:cxnSp>
+        <p:nvCxnSpPr>
+          <p:cNvPr id="15" name="Straight Arrow Connector 14">
+            <a:extLst>
+              <a:ext uri="{FF2B5EF4-FFF2-40B4-BE49-F238E27FC236}">
+                <a16:creationId xmlns:a16="http://schemas.microsoft.com/office/drawing/2014/main" id="{69E66BCD-BDE9-9745-88A6-EAC3F067E080}"/>
+              </a:ext>
+            </a:extLst>
+          </p:cNvPr>
+          <p:cNvCxnSpPr/>
+          <p:nvPr/>
+        </p:nvCxnSpPr>
+        <p:spPr>
+          <a:xfrm>
+            <a:off x="9262110" y="3962400"/>
+            <a:ext cx="0" cy="438150"/>
+          </a:xfrm>
+          <a:prstGeom prst="straightConnector1">
+            <a:avLst/>
+          </a:prstGeom>
+          <a:ln w="25400">
+            <a:solidFill>
+              <a:schemeClr val="tx1"/>
+            </a:solidFill>
+            <a:tailEnd type="triangle" w="lg" len="lg"/>
+          </a:ln>
+        </p:spPr>
+        <p:style>
+          <a:lnRef idx="1">
+            <a:schemeClr val="accent1"/>
+          </a:lnRef>
+          <a:fillRef idx="0">
+            <a:schemeClr val="accent1"/>
+          </a:fillRef>
+          <a:effectRef idx="0">
+            <a:schemeClr val="accent1"/>
+          </a:effectRef>
+          <a:fontRef idx="minor">
+            <a:schemeClr val="tx1"/>
+          </a:fontRef>
+        </p:style>
+      </p:cxnSp>
       <p:sp>
         <p:nvSpPr>
           <p:cNvPr id="16" name="Rectangle 15">
@@ -5694,13 +5679,18 @@
         </p:nvSpPr>
         <p:spPr>
           <a:xfrm>
-            <a:off x="7250430" y="3329940"/>
+            <a:off x="7250430" y="4431030"/>
             <a:ext cx="4023360" cy="662940"/>
           </a:xfrm>
           <a:prstGeom prst="rect">
             <a:avLst/>
           </a:prstGeom>
-          <a:noFill/>
+          <a:solidFill>
+            <a:schemeClr val="accent2">
+              <a:lumMod val="40000"/>
+              <a:lumOff val="60000"/>
+            </a:schemeClr>
+          </a:solidFill>
           <a:ln w="25400">
             <a:solidFill>
               <a:schemeClr val="tx1"/>
@@ -5734,36 +5724,142 @@
                   <a:schemeClr val="tx1"/>
                 </a:solidFill>
               </a:rPr>
-              <a:t>Run the Application</a:t>
+              <a:t>7. Run the Application</a:t>
+            </a:r>
+          </a:p>
+        </p:txBody>
+      </p:sp>
+      <p:sp>
+        <p:nvSpPr>
+          <p:cNvPr id="17" name="Rectangle 16">
+            <a:extLst>
+              <a:ext uri="{FF2B5EF4-FFF2-40B4-BE49-F238E27FC236}">
+                <a16:creationId xmlns:a16="http://schemas.microsoft.com/office/drawing/2014/main" id="{399AF3D2-DA8B-1049-BEC2-8059CECB3D8B}"/>
+              </a:ext>
+            </a:extLst>
+          </p:cNvPr>
+          <p:cNvSpPr/>
+          <p:nvPr/>
+        </p:nvSpPr>
+        <p:spPr>
+          <a:xfrm>
+            <a:off x="1219201" y="1097280"/>
+            <a:ext cx="4023360" cy="662940"/>
+          </a:xfrm>
+          <a:prstGeom prst="rect">
+            <a:avLst/>
+          </a:prstGeom>
+          <a:solidFill>
+            <a:schemeClr val="accent2">
+              <a:lumMod val="40000"/>
+              <a:lumOff val="60000"/>
+            </a:schemeClr>
+          </a:solidFill>
+          <a:ln w="25400">
+            <a:solidFill>
+              <a:schemeClr val="tx1"/>
+            </a:solidFill>
+          </a:ln>
+        </p:spPr>
+        <p:style>
+          <a:lnRef idx="2">
+            <a:schemeClr val="accent1">
+              <a:shade val="50000"/>
+            </a:schemeClr>
+          </a:lnRef>
+          <a:fillRef idx="1">
+            <a:schemeClr val="accent1"/>
+          </a:fillRef>
+          <a:effectRef idx="0">
+            <a:schemeClr val="accent1"/>
+          </a:effectRef>
+          <a:fontRef idx="minor">
+            <a:schemeClr val="lt1"/>
+          </a:fontRef>
+        </p:style>
+        <p:txBody>
+          <a:bodyPr rtlCol="0" anchor="ctr"/>
+          <a:lstStyle/>
+          <a:p>
+            <a:pPr algn="ctr"/>
+            <a:r>
+              <a:rPr lang="en-US" dirty="0">
+                <a:solidFill>
+                  <a:schemeClr val="tx1"/>
+                </a:solidFill>
+              </a:rPr>
+              <a:t>0. Install Prerequisites</a:t>
             </a:r>
           </a:p>
         </p:txBody>
       </p:sp>
       <p:cxnSp>
         <p:nvCxnSpPr>
-          <p:cNvPr id="18" name="Elbow Connector 17">
-            <a:extLst>
-              <a:ext uri="{FF2B5EF4-FFF2-40B4-BE49-F238E27FC236}">
-                <a16:creationId xmlns:a16="http://schemas.microsoft.com/office/drawing/2014/main" id="{95C9DC59-005B-CC44-B309-AE9498470429}"/>
+          <p:cNvPr id="19" name="Straight Arrow Connector 18">
+            <a:extLst>
+              <a:ext uri="{FF2B5EF4-FFF2-40B4-BE49-F238E27FC236}">
+                <a16:creationId xmlns:a16="http://schemas.microsoft.com/office/drawing/2014/main" id="{035EF2D8-3DF2-474A-BC52-B0B0607085A8}"/>
+              </a:ext>
+            </a:extLst>
+          </p:cNvPr>
+          <p:cNvCxnSpPr/>
+          <p:nvPr/>
+        </p:nvCxnSpPr>
+        <p:spPr>
+          <a:xfrm>
+            <a:off x="3208022" y="1760220"/>
+            <a:ext cx="0" cy="438150"/>
+          </a:xfrm>
+          <a:prstGeom prst="straightConnector1">
+            <a:avLst/>
+          </a:prstGeom>
+          <a:ln w="25400">
+            <a:solidFill>
+              <a:schemeClr val="tx1"/>
+            </a:solidFill>
+            <a:tailEnd type="triangle" w="lg" len="lg"/>
+          </a:ln>
+        </p:spPr>
+        <p:style>
+          <a:lnRef idx="1">
+            <a:schemeClr val="accent1"/>
+          </a:lnRef>
+          <a:fillRef idx="0">
+            <a:schemeClr val="accent1"/>
+          </a:fillRef>
+          <a:effectRef idx="0">
+            <a:schemeClr val="accent1"/>
+          </a:effectRef>
+          <a:fontRef idx="minor">
+            <a:schemeClr val="tx1"/>
+          </a:fontRef>
+        </p:style>
+      </p:cxnSp>
+      <p:cxnSp>
+        <p:nvCxnSpPr>
+          <p:cNvPr id="11" name="Elbow Connector 10">
+            <a:extLst>
+              <a:ext uri="{FF2B5EF4-FFF2-40B4-BE49-F238E27FC236}">
+                <a16:creationId xmlns:a16="http://schemas.microsoft.com/office/drawing/2014/main" id="{BD461CF6-88F9-6848-AFD1-73AC060C9632}"/>
               </a:ext>
             </a:extLst>
           </p:cNvPr>
           <p:cNvCxnSpPr>
-            <a:stCxn id="9" idx="2"/>
-            <a:endCxn id="12" idx="0"/>
+            <a:stCxn id="8" idx="2"/>
+            <a:endCxn id="9" idx="0"/>
           </p:cNvCxnSpPr>
           <p:nvPr/>
         </p:nvCxnSpPr>
         <p:spPr>
           <a:xfrm rot="5400000" flipH="1" flipV="1">
-            <a:off x="4246245" y="78105"/>
-            <a:ext cx="3996690" cy="6035040"/>
+            <a:off x="4248150" y="80010"/>
+            <a:ext cx="3996690" cy="6031229"/>
           </a:xfrm>
           <a:prstGeom prst="bentConnector5">
             <a:avLst>
-              <a:gd name="adj1" fmla="val -8625"/>
+              <a:gd name="adj1" fmla="val -9152"/>
               <a:gd name="adj2" fmla="val 50000"/>
-              <a:gd name="adj3" fmla="val 112620"/>
+              <a:gd name="adj3" fmla="val 110296"/>
             </a:avLst>
           </a:prstGeom>
           <a:ln w="25400">

</xml_diff>